<commit_message>
Added custom seqs/models to tutorial
</commit_message>
<xml_diff>
--- a/tutorial.pptx
+++ b/tutorial.pptx
@@ -5,7 +5,7 @@
     <p:sldMasterId id="2147483648" r:id="rId1"/>
   </p:sldMasterIdLst>
   <p:notesMasterIdLst>
-    <p:notesMasterId r:id="rId37"/>
+    <p:notesMasterId r:id="rId40"/>
   </p:notesMasterIdLst>
   <p:sldIdLst>
     <p:sldId id="292" r:id="rId2"/>
@@ -41,8 +41,11 @@
     <p:sldId id="272" r:id="rId32"/>
     <p:sldId id="275" r:id="rId33"/>
     <p:sldId id="290" r:id="rId34"/>
-    <p:sldId id="287" r:id="rId35"/>
-    <p:sldId id="288" r:id="rId36"/>
+    <p:sldId id="293" r:id="rId35"/>
+    <p:sldId id="294" r:id="rId36"/>
+    <p:sldId id="287" r:id="rId37"/>
+    <p:sldId id="295" r:id="rId38"/>
+    <p:sldId id="288" r:id="rId39"/>
   </p:sldIdLst>
   <p:sldSz cx="12192000" cy="6858000"/>
   <p:notesSz cx="6858000" cy="9144000"/>
@@ -231,7 +234,7 @@
           <a:p>
             <a:fld id="{C97C85A1-F23B-45D6-93A9-644A85587E37}" type="datetimeFigureOut">
               <a:rPr lang="en-US" smtClean="0"/>
-              <a:t>3/15/2019</a:t>
+              <a:t>3/21/2019</a:t>
             </a:fld>
             <a:endParaRPr lang="en-US"/>
           </a:p>
@@ -729,7 +732,7 @@
           <a:p>
             <a:fld id="{BFEE60E5-82E9-43CE-B4C0-8C0BB9764285}" type="datetimeFigureOut">
               <a:rPr lang="en-US" smtClean="0"/>
-              <a:t>3/15/2019</a:t>
+              <a:t>3/21/2019</a:t>
             </a:fld>
             <a:endParaRPr lang="en-US"/>
           </a:p>
@@ -927,7 +930,7 @@
           <a:p>
             <a:fld id="{BFEE60E5-82E9-43CE-B4C0-8C0BB9764285}" type="datetimeFigureOut">
               <a:rPr lang="en-US" smtClean="0"/>
-              <a:t>3/15/2019</a:t>
+              <a:t>3/21/2019</a:t>
             </a:fld>
             <a:endParaRPr lang="en-US"/>
           </a:p>
@@ -1135,7 +1138,7 @@
           <a:p>
             <a:fld id="{BFEE60E5-82E9-43CE-B4C0-8C0BB9764285}" type="datetimeFigureOut">
               <a:rPr lang="en-US" smtClean="0"/>
-              <a:t>3/15/2019</a:t>
+              <a:t>3/21/2019</a:t>
             </a:fld>
             <a:endParaRPr lang="en-US"/>
           </a:p>
@@ -1333,7 +1336,7 @@
           <a:p>
             <a:fld id="{BFEE60E5-82E9-43CE-B4C0-8C0BB9764285}" type="datetimeFigureOut">
               <a:rPr lang="en-US" smtClean="0"/>
-              <a:t>3/15/2019</a:t>
+              <a:t>3/21/2019</a:t>
             </a:fld>
             <a:endParaRPr lang="en-US"/>
           </a:p>
@@ -1608,7 +1611,7 @@
           <a:p>
             <a:fld id="{BFEE60E5-82E9-43CE-B4C0-8C0BB9764285}" type="datetimeFigureOut">
               <a:rPr lang="en-US" smtClean="0"/>
-              <a:t>3/15/2019</a:t>
+              <a:t>3/21/2019</a:t>
             </a:fld>
             <a:endParaRPr lang="en-US"/>
           </a:p>
@@ -1873,7 +1876,7 @@
           <a:p>
             <a:fld id="{BFEE60E5-82E9-43CE-B4C0-8C0BB9764285}" type="datetimeFigureOut">
               <a:rPr lang="en-US" smtClean="0"/>
-              <a:t>3/15/2019</a:t>
+              <a:t>3/21/2019</a:t>
             </a:fld>
             <a:endParaRPr lang="en-US"/>
           </a:p>
@@ -2285,7 +2288,7 @@
           <a:p>
             <a:fld id="{BFEE60E5-82E9-43CE-B4C0-8C0BB9764285}" type="datetimeFigureOut">
               <a:rPr lang="en-US" smtClean="0"/>
-              <a:t>3/15/2019</a:t>
+              <a:t>3/21/2019</a:t>
             </a:fld>
             <a:endParaRPr lang="en-US"/>
           </a:p>
@@ -2426,7 +2429,7 @@
           <a:p>
             <a:fld id="{BFEE60E5-82E9-43CE-B4C0-8C0BB9764285}" type="datetimeFigureOut">
               <a:rPr lang="en-US" smtClean="0"/>
-              <a:t>3/15/2019</a:t>
+              <a:t>3/21/2019</a:t>
             </a:fld>
             <a:endParaRPr lang="en-US"/>
           </a:p>
@@ -2539,7 +2542,7 @@
           <a:p>
             <a:fld id="{BFEE60E5-82E9-43CE-B4C0-8C0BB9764285}" type="datetimeFigureOut">
               <a:rPr lang="en-US" smtClean="0"/>
-              <a:t>3/15/2019</a:t>
+              <a:t>3/21/2019</a:t>
             </a:fld>
             <a:endParaRPr lang="en-US"/>
           </a:p>
@@ -2850,7 +2853,7 @@
           <a:p>
             <a:fld id="{BFEE60E5-82E9-43CE-B4C0-8C0BB9764285}" type="datetimeFigureOut">
               <a:rPr lang="en-US" smtClean="0"/>
-              <a:t>3/15/2019</a:t>
+              <a:t>3/21/2019</a:t>
             </a:fld>
             <a:endParaRPr lang="en-US"/>
           </a:p>
@@ -3138,7 +3141,7 @@
           <a:p>
             <a:fld id="{BFEE60E5-82E9-43CE-B4C0-8C0BB9764285}" type="datetimeFigureOut">
               <a:rPr lang="en-US" smtClean="0"/>
-              <a:t>3/15/2019</a:t>
+              <a:t>3/21/2019</a:t>
             </a:fld>
             <a:endParaRPr lang="en-US"/>
           </a:p>
@@ -3379,7 +3382,7 @@
           <a:p>
             <a:fld id="{BFEE60E5-82E9-43CE-B4C0-8C0BB9764285}" type="datetimeFigureOut">
               <a:rPr lang="en-US" smtClean="0"/>
-              <a:t>3/15/2019</a:t>
+              <a:t>3/21/2019</a:t>
             </a:fld>
             <a:endParaRPr lang="en-US"/>
           </a:p>
@@ -13403,7 +13406,7 @@
           <p:cNvPr id="2" name="Title 1">
             <a:extLst>
               <a:ext uri="{FF2B5EF4-FFF2-40B4-BE49-F238E27FC236}">
-                <a16:creationId xmlns:a16="http://schemas.microsoft.com/office/drawing/2014/main" id="{2B83A347-4732-4003-96F0-38EE409E13D6}"/>
+                <a16:creationId xmlns:a16="http://schemas.microsoft.com/office/drawing/2014/main" id="{10BE028F-F0F5-4BFC-AB63-78FC0EE71C1C}"/>
               </a:ext>
             </a:extLst>
           </p:cNvPr>
@@ -13421,7 +13424,7 @@
           <a:p>
             <a:r>
               <a:rPr lang="en-US" dirty="0"/>
-              <a:t>Untested features</a:t>
+              <a:t>Using custom local models</a:t>
             </a:r>
           </a:p>
         </p:txBody>
@@ -13431,7 +13434,7 @@
           <p:cNvPr id="3" name="Content Placeholder 2">
             <a:extLst>
               <a:ext uri="{FF2B5EF4-FFF2-40B4-BE49-F238E27FC236}">
-                <a16:creationId xmlns:a16="http://schemas.microsoft.com/office/drawing/2014/main" id="{7572D989-0F46-44DF-94DF-E8002A49E2E7}"/>
+                <a16:creationId xmlns:a16="http://schemas.microsoft.com/office/drawing/2014/main" id="{38426948-31B6-4663-814C-5AB126BD450E}"/>
               </a:ext>
             </a:extLst>
           </p:cNvPr>
@@ -13442,58 +13445,124 @@
             <p:ph idx="1"/>
           </p:nvPr>
         </p:nvSpPr>
-        <p:spPr/>
+        <p:spPr>
+          <a:xfrm>
+            <a:off x="838200" y="1825625"/>
+            <a:ext cx="10515600" cy="4542518"/>
+          </a:xfrm>
+        </p:spPr>
         <p:txBody>
           <a:bodyPr>
-            <a:normAutofit/>
+            <a:normAutofit fontScale="62500" lnSpcReduction="20000"/>
           </a:bodyPr>
           <a:lstStyle/>
           <a:p>
-            <a:pPr marL="514350" indent="-514350">
-              <a:buAutoNum type="arabicPeriod"/>
-            </a:pPr>
-            <a:r>
-              <a:rPr lang="en-US" dirty="0"/>
-              <a:t>Expand variants (-e)</a:t>
-            </a:r>
-          </a:p>
-          <a:p>
-            <a:pPr lvl="1"/>
-            <a:r>
-              <a:rPr lang="en-US" dirty="0"/>
-              <a:t>The major consequence encountered will be missense variants. However, there may be instances in which a large portion of the protein is lost due to early stops, </a:t>
-            </a:r>
-            <a:r>
-              <a:rPr lang="en-US" dirty="0" err="1"/>
-              <a:t>inframe</a:t>
-            </a:r>
-            <a:r>
-              <a:rPr lang="en-US" dirty="0"/>
-              <a:t> deletions, and frameshifts. In these cases, it can be assumed in most cases that every residue downstream of the mutation is affected, thereby generating a list of individual variant positions. Setting this flag will accept these large variants and expand them to cover all downstream residues. However, it hasn’t been tested and may not yet work.</a:t>
-            </a:r>
-          </a:p>
-          <a:p>
             <a:pPr marL="0" indent="0">
               <a:buNone/>
             </a:pPr>
             <a:r>
               <a:rPr lang="en-US" dirty="0"/>
-              <a:t>2. Parallel processing (-n #)</a:t>
-            </a:r>
-          </a:p>
-          <a:p>
-            <a:pPr lvl="1"/>
-            <a:r>
-              <a:rPr lang="en-US" dirty="0"/>
-              <a:t>Uses python multiple instance pool to process individual </a:t>
-            </a:r>
-            <a:r>
-              <a:rPr lang="en-US" dirty="0" err="1"/>
-              <a:t>uniprots</a:t>
-            </a:r>
-            <a:r>
-              <a:rPr lang="en-US" dirty="0"/>
-              <a:t> in parallel. This hasn’t been tested but should work, maybe, who knows.</a:t>
+              <a:t>When you want to cast to local models not found in SWISSMODEL, use the –l flag with a file containing a list of structure files.</a:t>
+            </a:r>
+          </a:p>
+          <a:p>
+            <a:pPr marL="0" indent="0">
+              <a:buNone/>
+            </a:pPr>
+            <a:endParaRPr lang="en-US" dirty="0"/>
+          </a:p>
+          <a:p>
+            <a:pPr marL="0" indent="0">
+              <a:buNone/>
+            </a:pPr>
+            <a:r>
+              <a:rPr lang="en-US" dirty="0"/>
+              <a:t>Ex:</a:t>
+            </a:r>
+          </a:p>
+          <a:p>
+            <a:pPr marL="0" indent="0">
+              <a:buNone/>
+            </a:pPr>
+            <a:r>
+              <a:rPr lang="en-US" dirty="0"/>
+              <a:t>./cast_variant.py </a:t>
+            </a:r>
+            <a:r>
+              <a:rPr lang="en-US" dirty="0" err="1"/>
+              <a:t>myvars.tab</a:t>
+            </a:r>
+            <a:r>
+              <a:rPr lang="en-US" dirty="0"/>
+              <a:t> –l </a:t>
+            </a:r>
+            <a:r>
+              <a:rPr lang="en-US" dirty="0" err="1"/>
+              <a:t>mystructs.tab</a:t>
+            </a:r>
+            <a:endParaRPr lang="en-US" dirty="0"/>
+          </a:p>
+          <a:p>
+            <a:pPr marL="0" indent="0">
+              <a:buNone/>
+            </a:pPr>
+            <a:endParaRPr lang="en-US" dirty="0"/>
+          </a:p>
+          <a:p>
+            <a:pPr marL="0" indent="0">
+              <a:buNone/>
+            </a:pPr>
+            <a:r>
+              <a:rPr lang="en-US" dirty="0"/>
+              <a:t>Format of the list of structure files (must be tab delimited):</a:t>
+            </a:r>
+          </a:p>
+          <a:p>
+            <a:pPr marL="0" indent="0">
+              <a:buNone/>
+            </a:pPr>
+            <a:endParaRPr lang="en-US" dirty="0"/>
+          </a:p>
+          <a:p>
+            <a:pPr marL="0" indent="0">
+              <a:buNone/>
+            </a:pPr>
+            <a:r>
+              <a:rPr lang="en-US" dirty="0"/>
+              <a:t>TRANSCRIPT_ID1	MODEL_FILE1.pdb(full path)</a:t>
+            </a:r>
+          </a:p>
+          <a:p>
+            <a:pPr marL="0" indent="0">
+              <a:buNone/>
+            </a:pPr>
+            <a:r>
+              <a:rPr lang="en-US" dirty="0"/>
+              <a:t>TRANSCRIPT_ID1	MODEL_FILE2.pdb(full path)</a:t>
+            </a:r>
+          </a:p>
+          <a:p>
+            <a:pPr marL="0" indent="0">
+              <a:buNone/>
+            </a:pPr>
+            <a:r>
+              <a:rPr lang="en-US" dirty="0"/>
+              <a:t>TRANSCRIPT_ID2	MODEL_FILE3.pdb(full path)</a:t>
+            </a:r>
+          </a:p>
+          <a:p>
+            <a:pPr marL="0" indent="0">
+              <a:buNone/>
+            </a:pPr>
+            <a:endParaRPr lang="en-US" dirty="0"/>
+          </a:p>
+          <a:p>
+            <a:pPr marL="0" indent="0">
+              <a:buNone/>
+            </a:pPr>
+            <a:r>
+              <a:rPr lang="en-US" dirty="0"/>
+              <a:t>This list can contain any number of transcripts and model files. Variants are provided exactly the same, and the transcript column is used to match the model files. This will run variants normally but after casting to SWISSMODELs it will cast to any additional local custom models that you listed with a matching transcript.</a:t>
             </a:r>
           </a:p>
         </p:txBody>
@@ -13501,7 +13570,7 @@
     </p:spTree>
     <p:extLst>
       <p:ext uri="{BB962C8B-B14F-4D97-AF65-F5344CB8AC3E}">
-        <p14:creationId xmlns:p14="http://schemas.microsoft.com/office/powerpoint/2010/main" val="3766038946"/>
+        <p14:creationId xmlns:p14="http://schemas.microsoft.com/office/powerpoint/2010/main" val="3786832553"/>
       </p:ext>
     </p:extLst>
   </p:cSld>
@@ -13533,7 +13602,7 @@
           <p:cNvPr id="2" name="Title 1">
             <a:extLst>
               <a:ext uri="{FF2B5EF4-FFF2-40B4-BE49-F238E27FC236}">
-                <a16:creationId xmlns:a16="http://schemas.microsoft.com/office/drawing/2014/main" id="{38CDA9A3-B5C3-4B63-9EFB-EAFAE4B8C6F4}"/>
+                <a16:creationId xmlns:a16="http://schemas.microsoft.com/office/drawing/2014/main" id="{E4D3702F-CE43-42E1-8DC0-E37AFBFC6778}"/>
               </a:ext>
             </a:extLst>
           </p:cNvPr>
@@ -13551,7 +13620,7 @@
           <a:p>
             <a:r>
               <a:rPr lang="en-US" dirty="0"/>
-              <a:t>Future directions</a:t>
+              <a:t>Adding custom sequences</a:t>
             </a:r>
           </a:p>
         </p:txBody>
@@ -13561,7 +13630,7 @@
           <p:cNvPr id="3" name="Content Placeholder 2">
             <a:extLst>
               <a:ext uri="{FF2B5EF4-FFF2-40B4-BE49-F238E27FC236}">
-                <a16:creationId xmlns:a16="http://schemas.microsoft.com/office/drawing/2014/main" id="{196DF830-07A1-4A69-B9EE-E466A389EB1A}"/>
+                <a16:creationId xmlns:a16="http://schemas.microsoft.com/office/drawing/2014/main" id="{BEE40762-B2F0-4D9C-9C37-DBC891EAE2C8}"/>
               </a:ext>
             </a:extLst>
           </p:cNvPr>
@@ -13572,25 +13641,497 @@
             <p:ph idx="1"/>
           </p:nvPr>
         </p:nvSpPr>
+        <p:spPr>
+          <a:xfrm>
+            <a:off x="838200" y="1825624"/>
+            <a:ext cx="10515600" cy="4754789"/>
+          </a:xfrm>
+        </p:spPr>
+        <p:txBody>
+          <a:bodyPr>
+            <a:normAutofit fontScale="70000" lnSpcReduction="20000"/>
+          </a:bodyPr>
+          <a:lstStyle/>
+          <a:p>
+            <a:pPr marL="0" indent="0">
+              <a:buNone/>
+            </a:pPr>
+            <a:r>
+              <a:rPr lang="en-US" dirty="0"/>
+              <a:t>Potentially in cases where models are used, you may want to use a custom sequence the model is based on. Therefore, you can add custom sequences to the transcript or </a:t>
+            </a:r>
+            <a:r>
+              <a:rPr lang="en-US" dirty="0" err="1"/>
+              <a:t>uniprot</a:t>
+            </a:r>
+            <a:r>
+              <a:rPr lang="en-US" dirty="0"/>
+              <a:t> datasets.</a:t>
+            </a:r>
+          </a:p>
+          <a:p>
+            <a:pPr marL="0" indent="0">
+              <a:buNone/>
+            </a:pPr>
+            <a:endParaRPr lang="en-US" dirty="0"/>
+          </a:p>
+          <a:p>
+            <a:pPr marL="0" indent="0">
+              <a:buNone/>
+            </a:pPr>
+            <a:r>
+              <a:rPr lang="en-US" dirty="0"/>
+              <a:t>This must be done after running pickle_sequences.py</a:t>
+            </a:r>
+          </a:p>
+          <a:p>
+            <a:pPr marL="0" indent="0">
+              <a:buNone/>
+            </a:pPr>
+            <a:endParaRPr lang="en-US" dirty="0"/>
+          </a:p>
+          <a:p>
+            <a:pPr marL="0" indent="0">
+              <a:buNone/>
+            </a:pPr>
+            <a:r>
+              <a:rPr lang="en-US" dirty="0"/>
+              <a:t>In datasets, run:</a:t>
+            </a:r>
+          </a:p>
+          <a:p>
+            <a:pPr marL="0" indent="0">
+              <a:buNone/>
+            </a:pPr>
+            <a:r>
+              <a:rPr lang="en-US" dirty="0"/>
+              <a:t>./add_custom_sequences.py </a:t>
+            </a:r>
+            <a:r>
+              <a:rPr lang="en-US" dirty="0" err="1"/>
+              <a:t>your_seqs.fasta</a:t>
+            </a:r>
+            <a:r>
+              <a:rPr lang="en-US" dirty="0"/>
+              <a:t> </a:t>
+            </a:r>
+            <a:r>
+              <a:rPr lang="en-US" dirty="0" err="1"/>
+              <a:t>destination.pickle</a:t>
+            </a:r>
+            <a:endParaRPr lang="en-US" dirty="0"/>
+          </a:p>
+          <a:p>
+            <a:pPr marL="0" indent="0">
+              <a:buNone/>
+            </a:pPr>
+            <a:endParaRPr lang="en-US" dirty="0"/>
+          </a:p>
+          <a:p>
+            <a:pPr marL="0" indent="0">
+              <a:buNone/>
+            </a:pPr>
+            <a:r>
+              <a:rPr lang="en-US" dirty="0"/>
+              <a:t>Your sequence file can contain any number of </a:t>
+            </a:r>
+            <a:r>
+              <a:rPr lang="en-US" dirty="0" err="1"/>
+              <a:t>fasta’s</a:t>
+            </a:r>
+            <a:r>
+              <a:rPr lang="en-US" dirty="0"/>
+              <a:t> as long as they have a header line in the format:</a:t>
+            </a:r>
+          </a:p>
+          <a:p>
+            <a:pPr marL="0" indent="0">
+              <a:buNone/>
+            </a:pPr>
+            <a:r>
+              <a:rPr lang="en-US" dirty="0"/>
+              <a:t>&gt; Custom identifier</a:t>
+            </a:r>
+          </a:p>
+          <a:p>
+            <a:pPr marL="0" indent="0">
+              <a:buNone/>
+            </a:pPr>
+            <a:endParaRPr lang="en-US" dirty="0"/>
+          </a:p>
+          <a:p>
+            <a:pPr marL="0" indent="0">
+              <a:buNone/>
+            </a:pPr>
+            <a:r>
+              <a:rPr lang="en-US" dirty="0"/>
+              <a:t>Note: If that identifier is already found in whatever destination you supplied, it will, by default overwrite that entry and tell you. If you don’t want to add sequences if the ID is already there, add a 1 as the third argument of the command line.</a:t>
+            </a:r>
+          </a:p>
+        </p:txBody>
+      </p:sp>
+    </p:spTree>
+    <p:extLst>
+      <p:ext uri="{BB962C8B-B14F-4D97-AF65-F5344CB8AC3E}">
+        <p14:creationId xmlns:p14="http://schemas.microsoft.com/office/powerpoint/2010/main" val="1160073055"/>
+      </p:ext>
+    </p:extLst>
+  </p:cSld>
+  <p:clrMapOvr>
+    <a:masterClrMapping/>
+  </p:clrMapOvr>
+</p:sld>
+</file>
+
+<file path=ppt/slides/slide36.xml><?xml version="1.0" encoding="utf-8"?>
+<p:sld xmlns:a="http://schemas.openxmlformats.org/drawingml/2006/main" xmlns:r="http://schemas.openxmlformats.org/officeDocument/2006/relationships" xmlns:p="http://schemas.openxmlformats.org/presentationml/2006/main">
+  <p:cSld>
+    <p:spTree>
+      <p:nvGrpSpPr>
+        <p:cNvPr id="1" name=""/>
+        <p:cNvGrpSpPr/>
+        <p:nvPr/>
+      </p:nvGrpSpPr>
+      <p:grpSpPr>
+        <a:xfrm>
+          <a:off x="0" y="0"/>
+          <a:ext cx="0" cy="0"/>
+          <a:chOff x="0" y="0"/>
+          <a:chExt cx="0" cy="0"/>
+        </a:xfrm>
+      </p:grpSpPr>
+      <p:sp>
+        <p:nvSpPr>
+          <p:cNvPr id="2" name="Title 1">
+            <a:extLst>
+              <a:ext uri="{FF2B5EF4-FFF2-40B4-BE49-F238E27FC236}">
+                <a16:creationId xmlns:a16="http://schemas.microsoft.com/office/drawing/2014/main" id="{2B83A347-4732-4003-96F0-38EE409E13D6}"/>
+              </a:ext>
+            </a:extLst>
+          </p:cNvPr>
+          <p:cNvSpPr>
+            <a:spLocks noGrp="1"/>
+          </p:cNvSpPr>
+          <p:nvPr>
+            <p:ph type="title"/>
+          </p:nvPr>
+        </p:nvSpPr>
         <p:spPr/>
         <p:txBody>
           <a:bodyPr/>
           <a:lstStyle/>
           <a:p>
+            <a:r>
+              <a:rPr lang="en-US" dirty="0"/>
+              <a:t>Untested features</a:t>
+            </a:r>
+          </a:p>
+        </p:txBody>
+      </p:sp>
+      <p:sp>
+        <p:nvSpPr>
+          <p:cNvPr id="3" name="Content Placeholder 2">
+            <a:extLst>
+              <a:ext uri="{FF2B5EF4-FFF2-40B4-BE49-F238E27FC236}">
+                <a16:creationId xmlns:a16="http://schemas.microsoft.com/office/drawing/2014/main" id="{7572D989-0F46-44DF-94DF-E8002A49E2E7}"/>
+              </a:ext>
+            </a:extLst>
+          </p:cNvPr>
+          <p:cNvSpPr>
+            <a:spLocks noGrp="1"/>
+          </p:cNvSpPr>
+          <p:nvPr>
+            <p:ph idx="1"/>
+          </p:nvPr>
+        </p:nvSpPr>
+        <p:spPr/>
+        <p:txBody>
+          <a:bodyPr>
+            <a:normAutofit/>
+          </a:bodyPr>
+          <a:lstStyle/>
+          <a:p>
+            <a:pPr marL="514350" indent="-514350">
+              <a:buAutoNum type="arabicPeriod"/>
+            </a:pPr>
+            <a:r>
+              <a:rPr lang="en-US" dirty="0"/>
+              <a:t>Expand variants (-e)</a:t>
+            </a:r>
+          </a:p>
+          <a:p>
+            <a:pPr lvl="1"/>
+            <a:r>
+              <a:rPr lang="en-US" dirty="0"/>
+              <a:t>The major consequence encountered will be missense variants. However, there may be instances in which a large portion of the protein is lost due to early stops, </a:t>
+            </a:r>
+            <a:r>
+              <a:rPr lang="en-US" dirty="0" err="1"/>
+              <a:t>inframe</a:t>
+            </a:r>
+            <a:r>
+              <a:rPr lang="en-US" dirty="0"/>
+              <a:t> deletions, and frameshifts. In these cases, it can be assumed in most cases that every residue downstream of the mutation is affected, thereby generating a list of individual variant positions. Setting this flag will accept these large variants and expand them to cover all downstream residues. However, it hasn’t been tested and may not yet work.</a:t>
+            </a:r>
+          </a:p>
+          <a:p>
             <a:pPr marL="0" indent="0">
               <a:buNone/>
             </a:pPr>
             <a:r>
               <a:rPr lang="en-US" dirty="0"/>
-              <a:t>Add the ability to use your own models.</a:t>
-            </a:r>
-          </a:p>
+              <a:t>2. Parallel processing (-n #)</a:t>
+            </a:r>
+          </a:p>
+          <a:p>
+            <a:pPr lvl="1"/>
+            <a:r>
+              <a:rPr lang="en-US" dirty="0"/>
+              <a:t>Uses python multiple instance pool to process individual </a:t>
+            </a:r>
+            <a:r>
+              <a:rPr lang="en-US" dirty="0" err="1"/>
+              <a:t>uniprots</a:t>
+            </a:r>
+            <a:r>
+              <a:rPr lang="en-US" dirty="0"/>
+              <a:t> in parallel. This hasn’t been tested but should work, maybe, who knows.</a:t>
+            </a:r>
+          </a:p>
+        </p:txBody>
+      </p:sp>
+    </p:spTree>
+    <p:extLst>
+      <p:ext uri="{BB962C8B-B14F-4D97-AF65-F5344CB8AC3E}">
+        <p14:creationId xmlns:p14="http://schemas.microsoft.com/office/powerpoint/2010/main" val="3766038946"/>
+      </p:ext>
+    </p:extLst>
+  </p:cSld>
+  <p:clrMapOvr>
+    <a:masterClrMapping/>
+  </p:clrMapOvr>
+</p:sld>
+</file>
+
+<file path=ppt/slides/slide37.xml><?xml version="1.0" encoding="utf-8"?>
+<p:sld xmlns:a="http://schemas.openxmlformats.org/drawingml/2006/main" xmlns:r="http://schemas.openxmlformats.org/officeDocument/2006/relationships" xmlns:p="http://schemas.openxmlformats.org/presentationml/2006/main">
+  <p:cSld>
+    <p:spTree>
+      <p:nvGrpSpPr>
+        <p:cNvPr id="1" name=""/>
+        <p:cNvGrpSpPr/>
+        <p:nvPr/>
+      </p:nvGrpSpPr>
+      <p:grpSpPr>
+        <a:xfrm>
+          <a:off x="0" y="0"/>
+          <a:ext cx="0" cy="0"/>
+          <a:chOff x="0" y="0"/>
+          <a:chExt cx="0" cy="0"/>
+        </a:xfrm>
+      </p:grpSpPr>
+      <p:sp>
+        <p:nvSpPr>
+          <p:cNvPr id="2" name="Title 1">
+            <a:extLst>
+              <a:ext uri="{FF2B5EF4-FFF2-40B4-BE49-F238E27FC236}">
+                <a16:creationId xmlns:a16="http://schemas.microsoft.com/office/drawing/2014/main" id="{C5CE1978-CE91-4085-8385-C9272BDE6EE2}"/>
+              </a:ext>
+            </a:extLst>
+          </p:cNvPr>
+          <p:cNvSpPr>
+            <a:spLocks noGrp="1"/>
+          </p:cNvSpPr>
+          <p:nvPr>
+            <p:ph type="title"/>
+          </p:nvPr>
+        </p:nvSpPr>
+        <p:spPr/>
+        <p:txBody>
+          <a:bodyPr/>
+          <a:lstStyle/>
+          <a:p>
+            <a:r>
+              <a:rPr lang="en-US" dirty="0"/>
+              <a:t>A final note on </a:t>
+            </a:r>
+            <a:r>
+              <a:rPr lang="en-US" dirty="0" err="1"/>
+              <a:t>uniprots</a:t>
+            </a:r>
+            <a:endParaRPr lang="en-US" dirty="0"/>
+          </a:p>
+        </p:txBody>
+      </p:sp>
+      <p:sp>
+        <p:nvSpPr>
+          <p:cNvPr id="3" name="Content Placeholder 2">
+            <a:extLst>
+              <a:ext uri="{FF2B5EF4-FFF2-40B4-BE49-F238E27FC236}">
+                <a16:creationId xmlns:a16="http://schemas.microsoft.com/office/drawing/2014/main" id="{F8B3A945-8C66-4255-9F0A-DFD78A8CE70E}"/>
+              </a:ext>
+            </a:extLst>
+          </p:cNvPr>
+          <p:cNvSpPr>
+            <a:spLocks noGrp="1"/>
+          </p:cNvSpPr>
+          <p:nvPr>
+            <p:ph idx="1"/>
+          </p:nvPr>
+        </p:nvSpPr>
+        <p:spPr/>
+        <p:txBody>
+          <a:bodyPr/>
+          <a:lstStyle/>
           <a:p>
             <a:pPr marL="0" indent="0">
               <a:buNone/>
             </a:pPr>
+            <a:r>
+              <a:rPr lang="en-US" dirty="0"/>
+              <a:t>It’s not necessary to have a </a:t>
+            </a:r>
+            <a:r>
+              <a:rPr lang="en-US" dirty="0" err="1"/>
+              <a:t>uniprot</a:t>
+            </a:r>
+            <a:r>
+              <a:rPr lang="en-US" dirty="0"/>
+              <a:t> in the </a:t>
+            </a:r>
+            <a:r>
+              <a:rPr lang="en-US" dirty="0" err="1"/>
+              <a:t>uniprot</a:t>
+            </a:r>
+            <a:r>
+              <a:rPr lang="en-US" dirty="0"/>
+              <a:t> column of the variant file. Things like -, ?, None, etc. are also automatically flagged as missing.</a:t>
+            </a:r>
+          </a:p>
+          <a:p>
+            <a:pPr marL="0" indent="0">
+              <a:buNone/>
+            </a:pPr>
             <a:endParaRPr lang="en-US" dirty="0"/>
           </a:p>
+          <a:p>
+            <a:pPr marL="0" indent="0">
+              <a:buNone/>
+            </a:pPr>
+            <a:r>
+              <a:rPr lang="en-US" dirty="0"/>
+              <a:t>In the case of missing </a:t>
+            </a:r>
+            <a:r>
+              <a:rPr lang="en-US" dirty="0" err="1"/>
+              <a:t>uniprots</a:t>
+            </a:r>
+            <a:r>
+              <a:rPr lang="en-US" dirty="0"/>
+              <a:t>, </a:t>
+            </a:r>
+            <a:r>
+              <a:rPr lang="en-US" dirty="0" err="1"/>
+              <a:t>cast_variant</a:t>
+            </a:r>
+            <a:r>
+              <a:rPr lang="en-US" dirty="0"/>
+              <a:t> will attempt to assign a </a:t>
+            </a:r>
+            <a:r>
+              <a:rPr lang="en-US" dirty="0" err="1"/>
+              <a:t>uniprot</a:t>
+            </a:r>
+            <a:r>
+              <a:rPr lang="en-US" dirty="0"/>
+              <a:t> based on the transcript </a:t>
+            </a:r>
+            <a:r>
+              <a:rPr lang="en-US"/>
+              <a:t>ID.</a:t>
+            </a:r>
+            <a:endParaRPr lang="en-US" dirty="0"/>
+          </a:p>
+        </p:txBody>
+      </p:sp>
+    </p:spTree>
+    <p:extLst>
+      <p:ext uri="{BB962C8B-B14F-4D97-AF65-F5344CB8AC3E}">
+        <p14:creationId xmlns:p14="http://schemas.microsoft.com/office/powerpoint/2010/main" val="2038273819"/>
+      </p:ext>
+    </p:extLst>
+  </p:cSld>
+  <p:clrMapOvr>
+    <a:masterClrMapping/>
+  </p:clrMapOvr>
+</p:sld>
+</file>
+
+<file path=ppt/slides/slide38.xml><?xml version="1.0" encoding="utf-8"?>
+<p:sld xmlns:a="http://schemas.openxmlformats.org/drawingml/2006/main" xmlns:r="http://schemas.openxmlformats.org/officeDocument/2006/relationships" xmlns:p="http://schemas.openxmlformats.org/presentationml/2006/main">
+  <p:cSld>
+    <p:spTree>
+      <p:nvGrpSpPr>
+        <p:cNvPr id="1" name=""/>
+        <p:cNvGrpSpPr/>
+        <p:nvPr/>
+      </p:nvGrpSpPr>
+      <p:grpSpPr>
+        <a:xfrm>
+          <a:off x="0" y="0"/>
+          <a:ext cx="0" cy="0"/>
+          <a:chOff x="0" y="0"/>
+          <a:chExt cx="0" cy="0"/>
+        </a:xfrm>
+      </p:grpSpPr>
+      <p:sp>
+        <p:nvSpPr>
+          <p:cNvPr id="2" name="Title 1">
+            <a:extLst>
+              <a:ext uri="{FF2B5EF4-FFF2-40B4-BE49-F238E27FC236}">
+                <a16:creationId xmlns:a16="http://schemas.microsoft.com/office/drawing/2014/main" id="{38CDA9A3-B5C3-4B63-9EFB-EAFAE4B8C6F4}"/>
+              </a:ext>
+            </a:extLst>
+          </p:cNvPr>
+          <p:cNvSpPr>
+            <a:spLocks noGrp="1"/>
+          </p:cNvSpPr>
+          <p:nvPr>
+            <p:ph type="title"/>
+          </p:nvPr>
+        </p:nvSpPr>
+        <p:spPr/>
+        <p:txBody>
+          <a:bodyPr/>
+          <a:lstStyle/>
+          <a:p>
+            <a:r>
+              <a:rPr lang="en-US" dirty="0"/>
+              <a:t>Future directions</a:t>
+            </a:r>
+          </a:p>
+        </p:txBody>
+      </p:sp>
+      <p:sp>
+        <p:nvSpPr>
+          <p:cNvPr id="3" name="Content Placeholder 2">
+            <a:extLst>
+              <a:ext uri="{FF2B5EF4-FFF2-40B4-BE49-F238E27FC236}">
+                <a16:creationId xmlns:a16="http://schemas.microsoft.com/office/drawing/2014/main" id="{196DF830-07A1-4A69-B9EE-E466A389EB1A}"/>
+              </a:ext>
+            </a:extLst>
+          </p:cNvPr>
+          <p:cNvSpPr>
+            <a:spLocks noGrp="1"/>
+          </p:cNvSpPr>
+          <p:nvPr>
+            <p:ph idx="1"/>
+          </p:nvPr>
+        </p:nvSpPr>
+        <p:spPr/>
+        <p:txBody>
+          <a:bodyPr/>
+          <a:lstStyle/>
           <a:p>
             <a:pPr marL="0" indent="0">
               <a:buNone/>

</xml_diff>